<commit_message>
Last Update 29-06-2019  8:40:42.73
</commit_message>
<xml_diff>
--- a/Presentations/Unit 1/CS8392-U1-14-Packages.pptx
+++ b/Presentations/Unit 1/CS8392-U1-14-Packages.pptx
@@ -5,7 +5,7 @@
     <p:sldMasterId id="2147483648" r:id="rId1"/>
   </p:sldMasterIdLst>
   <p:notesMasterIdLst>
-    <p:notesMasterId r:id="rId17"/>
+    <p:notesMasterId r:id="rId19"/>
   </p:notesMasterIdLst>
   <p:sldIdLst>
     <p:sldId id="256" r:id="rId2"/>
@@ -22,7 +22,9 @@
     <p:sldId id="283" r:id="rId13"/>
     <p:sldId id="284" r:id="rId14"/>
     <p:sldId id="285" r:id="rId15"/>
-    <p:sldId id="272" r:id="rId16"/>
+    <p:sldId id="286" r:id="rId16"/>
+    <p:sldId id="287" r:id="rId17"/>
+    <p:sldId id="272" r:id="rId18"/>
   </p:sldIdLst>
   <p:sldSz cx="9144000" cy="6858000" type="screen4x3"/>
   <p:notesSz cx="6858000" cy="9144000"/>
@@ -1642,7 +1644,7 @@
   <dgm:whole/>
   <dgm:extLst>
     <a:ext uri="http://schemas.microsoft.com/office/drawing/2008/diagram">
-      <dsp:dataModelExt xmlns:dsp="http://schemas.microsoft.com/office/drawing/2008/diagram" xmlns="" relId="rId6" minVer="http://schemas.openxmlformats.org/drawingml/2006/diagram"/>
+      <dsp:dataModelExt xmlns="" xmlns:dsp="http://schemas.microsoft.com/office/drawing/2008/diagram" relId="rId6" minVer="http://schemas.openxmlformats.org/drawingml/2006/diagram"/>
     </a:ext>
   </dgm:extLst>
 </dgm:dataModel>
@@ -4178,7 +4180,7 @@
             <a:fld id="{9515075B-F3F0-4441-A1BD-B7B515B708FF}" type="datetimeFigureOut">
               <a:rPr lang="en-US" smtClean="0"/>
               <a:pPr/>
-              <a:t>7/23/2018</a:t>
+              <a:t>6/27/2019</a:t>
             </a:fld>
             <a:endParaRPr lang="en-US"/>
           </a:p>
@@ -4633,7 +4635,7 @@
             <a:fld id="{6E658DF8-B8C0-4C7F-85EB-B53A2DDD44A9}" type="datetimeFigureOut">
               <a:rPr lang="en-US" smtClean="0"/>
               <a:pPr/>
-              <a:t>7/23/2018</a:t>
+              <a:t>6/27/2019</a:t>
             </a:fld>
             <a:endParaRPr lang="en-US"/>
           </a:p>
@@ -4800,7 +4802,7 @@
             <a:fld id="{6E658DF8-B8C0-4C7F-85EB-B53A2DDD44A9}" type="datetimeFigureOut">
               <a:rPr lang="en-US" smtClean="0"/>
               <a:pPr/>
-              <a:t>7/23/2018</a:t>
+              <a:t>6/27/2019</a:t>
             </a:fld>
             <a:endParaRPr lang="en-US"/>
           </a:p>
@@ -4977,7 +4979,7 @@
             <a:fld id="{6E658DF8-B8C0-4C7F-85EB-B53A2DDD44A9}" type="datetimeFigureOut">
               <a:rPr lang="en-US" smtClean="0"/>
               <a:pPr/>
-              <a:t>7/23/2018</a:t>
+              <a:t>6/27/2019</a:t>
             </a:fld>
             <a:endParaRPr lang="en-US"/>
           </a:p>
@@ -5176,7 +5178,7 @@
             <a:fld id="{6E658DF8-B8C0-4C7F-85EB-B53A2DDD44A9}" type="datetimeFigureOut">
               <a:rPr lang="en-US" smtClean="0"/>
               <a:pPr/>
-              <a:t>7/23/2018</a:t>
+              <a:t>6/27/2019</a:t>
             </a:fld>
             <a:endParaRPr lang="en-US"/>
           </a:p>
@@ -5419,7 +5421,7 @@
             <a:fld id="{6E658DF8-B8C0-4C7F-85EB-B53A2DDD44A9}" type="datetimeFigureOut">
               <a:rPr lang="en-US" smtClean="0"/>
               <a:pPr/>
-              <a:t>7/23/2018</a:t>
+              <a:t>6/27/2019</a:t>
             </a:fld>
             <a:endParaRPr lang="en-US"/>
           </a:p>
@@ -5704,7 +5706,7 @@
             <a:fld id="{6E658DF8-B8C0-4C7F-85EB-B53A2DDD44A9}" type="datetimeFigureOut">
               <a:rPr lang="en-US" smtClean="0"/>
               <a:pPr/>
-              <a:t>7/23/2018</a:t>
+              <a:t>6/27/2019</a:t>
             </a:fld>
             <a:endParaRPr lang="en-US"/>
           </a:p>
@@ -6123,7 +6125,7 @@
             <a:fld id="{6E658DF8-B8C0-4C7F-85EB-B53A2DDD44A9}" type="datetimeFigureOut">
               <a:rPr lang="en-US" smtClean="0"/>
               <a:pPr/>
-              <a:t>7/23/2018</a:t>
+              <a:t>6/27/2019</a:t>
             </a:fld>
             <a:endParaRPr lang="en-US"/>
           </a:p>
@@ -6238,7 +6240,7 @@
             <a:fld id="{6E658DF8-B8C0-4C7F-85EB-B53A2DDD44A9}" type="datetimeFigureOut">
               <a:rPr lang="en-US" smtClean="0"/>
               <a:pPr/>
-              <a:t>7/23/2018</a:t>
+              <a:t>6/27/2019</a:t>
             </a:fld>
             <a:endParaRPr lang="en-US"/>
           </a:p>
@@ -6330,7 +6332,7 @@
             <a:fld id="{6E658DF8-B8C0-4C7F-85EB-B53A2DDD44A9}" type="datetimeFigureOut">
               <a:rPr lang="en-US" smtClean="0"/>
               <a:pPr/>
-              <a:t>7/23/2018</a:t>
+              <a:t>6/27/2019</a:t>
             </a:fld>
             <a:endParaRPr lang="en-US"/>
           </a:p>
@@ -6604,7 +6606,7 @@
             <a:fld id="{6E658DF8-B8C0-4C7F-85EB-B53A2DDD44A9}" type="datetimeFigureOut">
               <a:rPr lang="en-US" smtClean="0"/>
               <a:pPr/>
-              <a:t>7/23/2018</a:t>
+              <a:t>6/27/2019</a:t>
             </a:fld>
             <a:endParaRPr lang="en-US"/>
           </a:p>
@@ -6854,7 +6856,7 @@
             <a:fld id="{6E658DF8-B8C0-4C7F-85EB-B53A2DDD44A9}" type="datetimeFigureOut">
               <a:rPr lang="en-US" smtClean="0"/>
               <a:pPr/>
-              <a:t>7/23/2018</a:t>
+              <a:t>6/27/2019</a:t>
             </a:fld>
             <a:endParaRPr lang="en-US"/>
           </a:p>
@@ -7070,7 +7072,7 @@
             <a:fld id="{6E658DF8-B8C0-4C7F-85EB-B53A2DDD44A9}" type="datetimeFigureOut">
               <a:rPr lang="en-US" smtClean="0"/>
               <a:pPr/>
-              <a:t>7/23/2018</a:t>
+              <a:t>6/27/2019</a:t>
             </a:fld>
             <a:endParaRPr lang="en-US"/>
           </a:p>
@@ -8768,13 +8770,408 @@
           <a:p>
             <a:r>
               <a:rPr lang="en-US" dirty="0" smtClean="0"/>
-              <a:t>We can create sub packages too.</a:t>
-            </a:r>
-          </a:p>
-          <a:p>
+              <a:t>We can create sub packages too</a:t>
+            </a:r>
             <a:r>
               <a:rPr lang="en-US" dirty="0" smtClean="0"/>
-              <a:t>We must use specify with dot (.).</a:t>
+              <a:t>.</a:t>
+            </a:r>
+          </a:p>
+          <a:p>
+            <a:r>
+              <a:rPr lang="en-IN" dirty="0" smtClean="0"/>
+              <a:t>Levels of packages separated with dot[.]</a:t>
+            </a:r>
+          </a:p>
+          <a:p>
+            <a:r>
+              <a:rPr lang="en-IN" dirty="0" err="1" smtClean="0"/>
+              <a:t>Eg</a:t>
+            </a:r>
+            <a:r>
+              <a:rPr lang="en-IN" dirty="0" smtClean="0"/>
+              <a:t>:</a:t>
+            </a:r>
+          </a:p>
+          <a:p>
+            <a:r>
+              <a:rPr lang="en-IN" dirty="0" err="1" smtClean="0"/>
+              <a:t>Java.io.Buffer</a:t>
+            </a:r>
+            <a:r>
+              <a:rPr lang="en-IN" dirty="0" err="1" smtClean="0"/>
+              <a:t>edReader</a:t>
+            </a:r>
+            <a:endParaRPr lang="en-US" dirty="0" smtClean="0"/>
+          </a:p>
+        </p:txBody>
+      </p:sp>
+      <p:sp>
+        <p:nvSpPr>
+          <p:cNvPr id="4" name="Rectangle 3"/>
+          <p:cNvSpPr/>
+          <p:nvPr/>
+        </p:nvSpPr>
+        <p:spPr>
+          <a:xfrm>
+            <a:off x="990600" y="5029200"/>
+            <a:ext cx="1524000" cy="533400"/>
+          </a:xfrm>
+          <a:prstGeom prst="rect">
+            <a:avLst/>
+          </a:prstGeom>
+        </p:spPr>
+        <p:style>
+          <a:lnRef idx="2">
+            <a:schemeClr val="accent1"/>
+          </a:lnRef>
+          <a:fillRef idx="1">
+            <a:schemeClr val="lt1"/>
+          </a:fillRef>
+          <a:effectRef idx="0">
+            <a:schemeClr val="accent1"/>
+          </a:effectRef>
+          <a:fontRef idx="minor">
+            <a:schemeClr val="dk1"/>
+          </a:fontRef>
+        </p:style>
+        <p:txBody>
+          <a:bodyPr rtlCol="0" anchor="ctr"/>
+          <a:lstStyle/>
+          <a:p>
+            <a:r>
+              <a:rPr lang="en-US" dirty="0" smtClean="0">
+                <a:solidFill>
+                  <a:srgbClr val="FF0000"/>
+                </a:solidFill>
+              </a:rPr>
+              <a:t>Main Package</a:t>
+            </a:r>
+            <a:endParaRPr lang="en-US" dirty="0">
+              <a:solidFill>
+                <a:srgbClr val="FF0000"/>
+              </a:solidFill>
+            </a:endParaRPr>
+          </a:p>
+        </p:txBody>
+      </p:sp>
+      <p:sp>
+        <p:nvSpPr>
+          <p:cNvPr id="5" name="Rectangle 4"/>
+          <p:cNvSpPr/>
+          <p:nvPr/>
+        </p:nvSpPr>
+        <p:spPr>
+          <a:xfrm>
+            <a:off x="2971800" y="5029200"/>
+            <a:ext cx="1524000" cy="533400"/>
+          </a:xfrm>
+          <a:prstGeom prst="rect">
+            <a:avLst/>
+          </a:prstGeom>
+        </p:spPr>
+        <p:style>
+          <a:lnRef idx="2">
+            <a:schemeClr val="accent1"/>
+          </a:lnRef>
+          <a:fillRef idx="1">
+            <a:schemeClr val="lt1"/>
+          </a:fillRef>
+          <a:effectRef idx="0">
+            <a:schemeClr val="accent1"/>
+          </a:effectRef>
+          <a:fontRef idx="minor">
+            <a:schemeClr val="dk1"/>
+          </a:fontRef>
+        </p:style>
+        <p:txBody>
+          <a:bodyPr rtlCol="0" anchor="ctr"/>
+          <a:lstStyle/>
+          <a:p>
+            <a:r>
+              <a:rPr lang="en-US" dirty="0" smtClean="0">
+                <a:solidFill>
+                  <a:srgbClr val="FF0000"/>
+                </a:solidFill>
+              </a:rPr>
+              <a:t>Sub Package</a:t>
+            </a:r>
+            <a:endParaRPr lang="en-US" dirty="0">
+              <a:solidFill>
+                <a:srgbClr val="FF0000"/>
+              </a:solidFill>
+            </a:endParaRPr>
+          </a:p>
+        </p:txBody>
+      </p:sp>
+      <p:sp>
+        <p:nvSpPr>
+          <p:cNvPr id="6" name="Rectangle 5"/>
+          <p:cNvSpPr/>
+          <p:nvPr/>
+        </p:nvSpPr>
+        <p:spPr>
+          <a:xfrm>
+            <a:off x="4800600" y="5029200"/>
+            <a:ext cx="1524000" cy="533400"/>
+          </a:xfrm>
+          <a:prstGeom prst="rect">
+            <a:avLst/>
+          </a:prstGeom>
+        </p:spPr>
+        <p:style>
+          <a:lnRef idx="2">
+            <a:schemeClr val="accent1"/>
+          </a:lnRef>
+          <a:fillRef idx="1">
+            <a:schemeClr val="lt1"/>
+          </a:fillRef>
+          <a:effectRef idx="0">
+            <a:schemeClr val="accent1"/>
+          </a:effectRef>
+          <a:fontRef idx="minor">
+            <a:schemeClr val="dk1"/>
+          </a:fontRef>
+        </p:style>
+        <p:txBody>
+          <a:bodyPr rtlCol="0" anchor="ctr"/>
+          <a:lstStyle/>
+          <a:p>
+            <a:r>
+              <a:rPr lang="en-US" dirty="0" smtClean="0">
+                <a:solidFill>
+                  <a:srgbClr val="FF0000"/>
+                </a:solidFill>
+              </a:rPr>
+              <a:t>Class Name</a:t>
+            </a:r>
+            <a:endParaRPr lang="en-US" dirty="0">
+              <a:solidFill>
+                <a:srgbClr val="FF0000"/>
+              </a:solidFill>
+            </a:endParaRPr>
+          </a:p>
+        </p:txBody>
+      </p:sp>
+      <p:cxnSp>
+        <p:nvCxnSpPr>
+          <p:cNvPr id="19" name="Straight Arrow Connector 18"/>
+          <p:cNvCxnSpPr>
+            <a:stCxn id="5" idx="0"/>
+          </p:cNvCxnSpPr>
+          <p:nvPr/>
+        </p:nvCxnSpPr>
+        <p:spPr>
+          <a:xfrm rot="16200000" flipV="1">
+            <a:off x="2324100" y="3619500"/>
+            <a:ext cx="1066800" cy="1752600"/>
+          </a:xfrm>
+          <a:prstGeom prst="straightConnector1">
+            <a:avLst/>
+          </a:prstGeom>
+          <a:ln>
+            <a:tailEnd type="arrow"/>
+          </a:ln>
+        </p:spPr>
+        <p:style>
+          <a:lnRef idx="2">
+            <a:schemeClr val="dk1"/>
+          </a:lnRef>
+          <a:fillRef idx="0">
+            <a:schemeClr val="dk1"/>
+          </a:fillRef>
+          <a:effectRef idx="1">
+            <a:schemeClr val="dk1"/>
+          </a:effectRef>
+          <a:fontRef idx="minor">
+            <a:schemeClr val="tx1"/>
+          </a:fontRef>
+        </p:style>
+      </p:cxnSp>
+      <p:cxnSp>
+        <p:nvCxnSpPr>
+          <p:cNvPr id="24" name="Straight Arrow Connector 23"/>
+          <p:cNvCxnSpPr/>
+          <p:nvPr/>
+        </p:nvCxnSpPr>
+        <p:spPr>
+          <a:xfrm rot="16200000" flipV="1">
+            <a:off x="1028700" y="4305300"/>
+            <a:ext cx="1066800" cy="381000"/>
+          </a:xfrm>
+          <a:prstGeom prst="straightConnector1">
+            <a:avLst/>
+          </a:prstGeom>
+          <a:ln>
+            <a:tailEnd type="arrow"/>
+          </a:ln>
+        </p:spPr>
+        <p:style>
+          <a:lnRef idx="2">
+            <a:schemeClr val="dk1"/>
+          </a:lnRef>
+          <a:fillRef idx="0">
+            <a:schemeClr val="dk1"/>
+          </a:fillRef>
+          <a:effectRef idx="1">
+            <a:schemeClr val="dk1"/>
+          </a:effectRef>
+          <a:fontRef idx="minor">
+            <a:schemeClr val="tx1"/>
+          </a:fontRef>
+        </p:style>
+      </p:cxnSp>
+      <p:cxnSp>
+        <p:nvCxnSpPr>
+          <p:cNvPr id="25" name="Straight Arrow Connector 24"/>
+          <p:cNvCxnSpPr>
+            <a:stCxn id="6" idx="0"/>
+          </p:cNvCxnSpPr>
+          <p:nvPr/>
+        </p:nvCxnSpPr>
+        <p:spPr>
+          <a:xfrm rot="16200000" flipV="1">
+            <a:off x="3848100" y="3314700"/>
+            <a:ext cx="1143000" cy="2286000"/>
+          </a:xfrm>
+          <a:prstGeom prst="straightConnector1">
+            <a:avLst/>
+          </a:prstGeom>
+          <a:ln>
+            <a:tailEnd type="arrow"/>
+          </a:ln>
+        </p:spPr>
+        <p:style>
+          <a:lnRef idx="2">
+            <a:schemeClr val="dk1"/>
+          </a:lnRef>
+          <a:fillRef idx="0">
+            <a:schemeClr val="dk1"/>
+          </a:fillRef>
+          <a:effectRef idx="1">
+            <a:schemeClr val="dk1"/>
+          </a:effectRef>
+          <a:fontRef idx="minor">
+            <a:schemeClr val="tx1"/>
+          </a:fontRef>
+        </p:style>
+      </p:cxnSp>
+    </p:spTree>
+  </p:cSld>
+  <p:clrMapOvr>
+    <a:masterClrMapping/>
+  </p:clrMapOvr>
+</p:sld>
+</file>
+
+<file path=ppt/slides/slide15.xml><?xml version="1.0" encoding="utf-8"?>
+<p:sld xmlns:a="http://schemas.openxmlformats.org/drawingml/2006/main" xmlns:r="http://schemas.openxmlformats.org/officeDocument/2006/relationships" xmlns:p="http://schemas.openxmlformats.org/presentationml/2006/main">
+  <p:cSld>
+    <p:spTree>
+      <p:nvGrpSpPr>
+        <p:cNvPr id="1" name=""/>
+        <p:cNvGrpSpPr/>
+        <p:nvPr/>
+      </p:nvGrpSpPr>
+      <p:grpSpPr>
+        <a:xfrm>
+          <a:off x="0" y="0"/>
+          <a:ext cx="0" cy="0"/>
+          <a:chOff x="0" y="0"/>
+          <a:chExt cx="0" cy="0"/>
+        </a:xfrm>
+      </p:grpSpPr>
+      <p:sp>
+        <p:nvSpPr>
+          <p:cNvPr id="2" name="Title 1"/>
+          <p:cNvSpPr>
+            <a:spLocks noGrp="1"/>
+          </p:cNvSpPr>
+          <p:nvPr>
+            <p:ph type="title"/>
+          </p:nvPr>
+        </p:nvSpPr>
+        <p:spPr/>
+        <p:txBody>
+          <a:bodyPr/>
+          <a:lstStyle/>
+          <a:p>
+            <a:r>
+              <a:rPr lang="en-IN" dirty="0" smtClean="0"/>
+              <a:t>Access Specifies</a:t>
+            </a:r>
+            <a:endParaRPr lang="en-US" dirty="0"/>
+          </a:p>
+        </p:txBody>
+      </p:sp>
+      <p:sp>
+        <p:nvSpPr>
+          <p:cNvPr id="3" name="Content Placeholder 2"/>
+          <p:cNvSpPr>
+            <a:spLocks noGrp="1"/>
+          </p:cNvSpPr>
+          <p:nvPr>
+            <p:ph idx="1"/>
+          </p:nvPr>
+        </p:nvSpPr>
+        <p:spPr/>
+        <p:txBody>
+          <a:bodyPr>
+            <a:normAutofit lnSpcReduction="10000"/>
+          </a:bodyPr>
+          <a:lstStyle/>
+          <a:p>
+            <a:r>
+              <a:rPr lang="en-IN" dirty="0" smtClean="0"/>
+              <a:t>It is a set of keywords that used to restrict the </a:t>
+            </a:r>
+            <a:r>
+              <a:rPr lang="en-US" dirty="0" smtClean="0"/>
+              <a:t>scope of a class, constructor , variable , method or data member</a:t>
+            </a:r>
+            <a:r>
+              <a:rPr lang="en-US" dirty="0" smtClean="0"/>
+              <a:t>.</a:t>
+            </a:r>
+          </a:p>
+          <a:p>
+            <a:r>
+              <a:rPr lang="en-IN" dirty="0" smtClean="0"/>
+              <a:t>It is also known as access modifiers</a:t>
+            </a:r>
+          </a:p>
+          <a:p>
+            <a:r>
+              <a:rPr lang="en-IN" dirty="0" smtClean="0"/>
+              <a:t>There are 4 modifiers.</a:t>
+            </a:r>
+          </a:p>
+          <a:p>
+            <a:pPr lvl="1"/>
+            <a:r>
+              <a:rPr lang="en-IN" dirty="0" smtClean="0"/>
+              <a:t>Public</a:t>
+            </a:r>
+          </a:p>
+          <a:p>
+            <a:pPr lvl="1"/>
+            <a:r>
+              <a:rPr lang="en-IN" dirty="0" smtClean="0"/>
+              <a:t>Private</a:t>
+            </a:r>
+          </a:p>
+          <a:p>
+            <a:pPr lvl="1"/>
+            <a:r>
+              <a:rPr lang="en-IN" dirty="0" smtClean="0"/>
+              <a:t>Protected</a:t>
+            </a:r>
+          </a:p>
+          <a:p>
+            <a:pPr lvl="1"/>
+            <a:r>
+              <a:rPr lang="en-IN" dirty="0" smtClean="0"/>
+              <a:t>Default</a:t>
             </a:r>
             <a:endParaRPr lang="en-US" dirty="0"/>
           </a:p>
@@ -8788,7 +9185,89 @@
 </p:sld>
 </file>
 
-<file path=ppt/slides/slide15.xml><?xml version="1.0" encoding="utf-8"?>
+<file path=ppt/slides/slide16.xml><?xml version="1.0" encoding="utf-8"?>
+<p:sld xmlns:a="http://schemas.openxmlformats.org/drawingml/2006/main" xmlns:r="http://schemas.openxmlformats.org/officeDocument/2006/relationships" xmlns:p="http://schemas.openxmlformats.org/presentationml/2006/main">
+  <p:cSld>
+    <p:spTree>
+      <p:nvGrpSpPr>
+        <p:cNvPr id="1" name=""/>
+        <p:cNvGrpSpPr/>
+        <p:nvPr/>
+      </p:nvGrpSpPr>
+      <p:grpSpPr>
+        <a:xfrm>
+          <a:off x="0" y="0"/>
+          <a:ext cx="0" cy="0"/>
+          <a:chOff x="0" y="0"/>
+          <a:chExt cx="0" cy="0"/>
+        </a:xfrm>
+      </p:grpSpPr>
+      <p:sp>
+        <p:nvSpPr>
+          <p:cNvPr id="2" name="Title 1"/>
+          <p:cNvSpPr>
+            <a:spLocks noGrp="1"/>
+          </p:cNvSpPr>
+          <p:nvPr>
+            <p:ph type="title"/>
+          </p:nvPr>
+        </p:nvSpPr>
+        <p:spPr/>
+        <p:txBody>
+          <a:bodyPr/>
+          <a:lstStyle/>
+          <a:p>
+            <a:r>
+              <a:rPr lang="en-IN" dirty="0" smtClean="0"/>
+              <a:t>Access Specifies </a:t>
+            </a:r>
+            <a:r>
+              <a:rPr lang="en-IN" dirty="0" err="1" smtClean="0"/>
+              <a:t>vs</a:t>
+            </a:r>
+            <a:r>
+              <a:rPr lang="en-IN" dirty="0" smtClean="0"/>
+              <a:t> Scope</a:t>
+            </a:r>
+            <a:endParaRPr lang="en-US" dirty="0"/>
+          </a:p>
+        </p:txBody>
+      </p:sp>
+      <p:pic>
+        <p:nvPicPr>
+          <p:cNvPr id="1026" name="Picture 2" descr="access-modifiers-in-java"/>
+          <p:cNvPicPr>
+            <a:picLocks noChangeAspect="1" noChangeArrowheads="1"/>
+          </p:cNvPicPr>
+          <p:nvPr/>
+        </p:nvPicPr>
+        <p:blipFill>
+          <a:blip r:embed="rId2"/>
+          <a:srcRect/>
+          <a:stretch>
+            <a:fillRect/>
+          </a:stretch>
+        </p:blipFill>
+        <p:spPr bwMode="auto">
+          <a:xfrm>
+            <a:off x="1066800" y="2802750"/>
+            <a:ext cx="7543800" cy="2576476"/>
+          </a:xfrm>
+          <a:prstGeom prst="rect">
+            <a:avLst/>
+          </a:prstGeom>
+          <a:noFill/>
+        </p:spPr>
+      </p:pic>
+    </p:spTree>
+  </p:cSld>
+  <p:clrMapOvr>
+    <a:masterClrMapping/>
+  </p:clrMapOvr>
+</p:sld>
+</file>
+
+<file path=ppt/slides/slide17.xml><?xml version="1.0" encoding="utf-8"?>
 <p:sld xmlns:a="http://schemas.openxmlformats.org/drawingml/2006/main" xmlns:r="http://schemas.openxmlformats.org/officeDocument/2006/relationships" xmlns:p="http://schemas.openxmlformats.org/presentationml/2006/main">
   <p:cSld>
     <p:spTree>
@@ -9957,7 +10436,11 @@
             <a:pPr lvl="1"/>
             <a:r>
               <a:rPr lang="en-US" dirty="0" smtClean="0"/>
-              <a:t>Insert package name in program.</a:t>
+              <a:t>Define package </a:t>
+            </a:r>
+            <a:r>
+              <a:rPr lang="en-US" dirty="0" smtClean="0"/>
+              <a:t>name in program.</a:t>
             </a:r>
           </a:p>
           <a:p>

</xml_diff>